<commit_message>
GraphQL primer za serijalizaciju
</commit_message>
<xml_diff>
--- a/02-serialization/serialization.pptx
+++ b/02-serialization/serialization.pptx
@@ -5,12 +5,15 @@
     <p:sldMasterId id="2147483648" r:id="rId1"/>
   </p:sldMasterIdLst>
   <p:notesMasterIdLst>
-    <p:notesMasterId r:id="rId5"/>
+    <p:notesMasterId r:id="rId8"/>
   </p:notesMasterIdLst>
   <p:sldIdLst>
     <p:sldId id="257" r:id="rId2"/>
     <p:sldId id="264" r:id="rId3"/>
     <p:sldId id="265" r:id="rId4"/>
+    <p:sldId id="268" r:id="rId5"/>
+    <p:sldId id="269" r:id="rId6"/>
+    <p:sldId id="266" r:id="rId7"/>
   </p:sldIdLst>
   <p:sldSz cx="12192000" cy="6858000"/>
   <p:notesSz cx="6858000" cy="9144000"/>
@@ -198,7 +201,7 @@
           </a:lstStyle>
           <a:p>
             <a:fld id="{29C6723B-5CA3-7948-ADA8-6A5BBA6EEB52}" type="datetimeFigureOut">
-              <a:t>9/28/19</a:t>
+              <a:t>14.10.23.</a:t>
             </a:fld>
             <a:endParaRPr lang="en-US"/>
           </a:p>
@@ -547,6 +550,174 @@
 </p:notes>
 </file>
 
+<file path=ppt/notesSlides/notesSlide2.xml><?xml version="1.0" encoding="utf-8"?>
+<p:notes xmlns:a="http://schemas.openxmlformats.org/drawingml/2006/main" xmlns:r="http://schemas.openxmlformats.org/officeDocument/2006/relationships" xmlns:p="http://schemas.openxmlformats.org/presentationml/2006/main">
+  <p:cSld>
+    <p:spTree>
+      <p:nvGrpSpPr>
+        <p:cNvPr id="1" name=""/>
+        <p:cNvGrpSpPr/>
+        <p:nvPr/>
+      </p:nvGrpSpPr>
+      <p:grpSpPr>
+        <a:xfrm>
+          <a:off x="0" y="0"/>
+          <a:ext cx="0" cy="0"/>
+          <a:chOff x="0" y="0"/>
+          <a:chExt cx="0" cy="0"/>
+        </a:xfrm>
+      </p:grpSpPr>
+      <p:sp>
+        <p:nvSpPr>
+          <p:cNvPr id="2" name="Slide Image Placeholder 1"/>
+          <p:cNvSpPr>
+            <a:spLocks noGrp="1" noRot="1" noChangeAspect="1"/>
+          </p:cNvSpPr>
+          <p:nvPr>
+            <p:ph type="sldImg"/>
+          </p:nvPr>
+        </p:nvSpPr>
+        <p:spPr/>
+      </p:sp>
+      <p:sp>
+        <p:nvSpPr>
+          <p:cNvPr id="3" name="Notes Placeholder 2"/>
+          <p:cNvSpPr>
+            <a:spLocks noGrp="1"/>
+          </p:cNvSpPr>
+          <p:nvPr>
+            <p:ph type="body" idx="1"/>
+          </p:nvPr>
+        </p:nvSpPr>
+        <p:spPr/>
+        <p:txBody>
+          <a:bodyPr/>
+          <a:lstStyle/>
+          <a:p>
+            <a:endParaRPr lang="en-RS" dirty="0"/>
+          </a:p>
+        </p:txBody>
+      </p:sp>
+      <p:sp>
+        <p:nvSpPr>
+          <p:cNvPr id="4" name="Slide Number Placeholder 3"/>
+          <p:cNvSpPr>
+            <a:spLocks noGrp="1"/>
+          </p:cNvSpPr>
+          <p:nvPr>
+            <p:ph type="sldNum" sz="quarter" idx="5"/>
+          </p:nvPr>
+        </p:nvSpPr>
+        <p:spPr/>
+        <p:txBody>
+          <a:bodyPr/>
+          <a:lstStyle/>
+          <a:p>
+            <a:fld id="{B33DFA4D-92E0-574E-AE3F-75D61E393F4F}" type="slidenum">
+              <a:rPr lang="en-RS" smtClean="0"/>
+              <a:t>4</a:t>
+            </a:fld>
+            <a:endParaRPr lang="en-RS"/>
+          </a:p>
+        </p:txBody>
+      </p:sp>
+    </p:spTree>
+    <p:extLst>
+      <p:ext uri="{BB962C8B-B14F-4D97-AF65-F5344CB8AC3E}">
+        <p14:creationId xmlns:p14="http://schemas.microsoft.com/office/powerpoint/2010/main" val="2753872156"/>
+      </p:ext>
+    </p:extLst>
+  </p:cSld>
+  <p:clrMapOvr>
+    <a:masterClrMapping/>
+  </p:clrMapOvr>
+</p:notes>
+</file>
+
+<file path=ppt/notesSlides/notesSlide3.xml><?xml version="1.0" encoding="utf-8"?>
+<p:notes xmlns:a="http://schemas.openxmlformats.org/drawingml/2006/main" xmlns:r="http://schemas.openxmlformats.org/officeDocument/2006/relationships" xmlns:p="http://schemas.openxmlformats.org/presentationml/2006/main">
+  <p:cSld>
+    <p:spTree>
+      <p:nvGrpSpPr>
+        <p:cNvPr id="1" name=""/>
+        <p:cNvGrpSpPr/>
+        <p:nvPr/>
+      </p:nvGrpSpPr>
+      <p:grpSpPr>
+        <a:xfrm>
+          <a:off x="0" y="0"/>
+          <a:ext cx="0" cy="0"/>
+          <a:chOff x="0" y="0"/>
+          <a:chExt cx="0" cy="0"/>
+        </a:xfrm>
+      </p:grpSpPr>
+      <p:sp>
+        <p:nvSpPr>
+          <p:cNvPr id="2" name="Slide Image Placeholder 1"/>
+          <p:cNvSpPr>
+            <a:spLocks noGrp="1" noRot="1" noChangeAspect="1"/>
+          </p:cNvSpPr>
+          <p:nvPr>
+            <p:ph type="sldImg"/>
+          </p:nvPr>
+        </p:nvSpPr>
+        <p:spPr/>
+      </p:sp>
+      <p:sp>
+        <p:nvSpPr>
+          <p:cNvPr id="3" name="Notes Placeholder 2"/>
+          <p:cNvSpPr>
+            <a:spLocks noGrp="1"/>
+          </p:cNvSpPr>
+          <p:nvPr>
+            <p:ph type="body" idx="1"/>
+          </p:nvPr>
+        </p:nvSpPr>
+        <p:spPr/>
+        <p:txBody>
+          <a:bodyPr/>
+          <a:lstStyle/>
+          <a:p>
+            <a:endParaRPr lang="en-RS" dirty="0"/>
+          </a:p>
+        </p:txBody>
+      </p:sp>
+      <p:sp>
+        <p:nvSpPr>
+          <p:cNvPr id="4" name="Slide Number Placeholder 3"/>
+          <p:cNvSpPr>
+            <a:spLocks noGrp="1"/>
+          </p:cNvSpPr>
+          <p:nvPr>
+            <p:ph type="sldNum" sz="quarter" idx="5"/>
+          </p:nvPr>
+        </p:nvSpPr>
+        <p:spPr/>
+        <p:txBody>
+          <a:bodyPr/>
+          <a:lstStyle/>
+          <a:p>
+            <a:fld id="{B33DFA4D-92E0-574E-AE3F-75D61E393F4F}" type="slidenum">
+              <a:rPr lang="en-RS" smtClean="0"/>
+              <a:t>5</a:t>
+            </a:fld>
+            <a:endParaRPr lang="en-RS"/>
+          </a:p>
+        </p:txBody>
+      </p:sp>
+    </p:spTree>
+    <p:extLst>
+      <p:ext uri="{BB962C8B-B14F-4D97-AF65-F5344CB8AC3E}">
+        <p14:creationId xmlns:p14="http://schemas.microsoft.com/office/powerpoint/2010/main" val="284361703"/>
+      </p:ext>
+    </p:extLst>
+  </p:cSld>
+  <p:clrMapOvr>
+    <a:masterClrMapping/>
+  </p:clrMapOvr>
+</p:notes>
+</file>
+
 <file path=ppt/slideLayouts/slideLayout1.xml><?xml version="1.0" encoding="utf-8"?>
 <p:sldLayout xmlns:a="http://schemas.openxmlformats.org/drawingml/2006/main" xmlns:r="http://schemas.openxmlformats.org/officeDocument/2006/relationships" xmlns:p="http://schemas.openxmlformats.org/presentationml/2006/main" type="title" preserve="1">
   <p:cSld name="Title Slide">
@@ -693,7 +864,7 @@
           <a:lstStyle/>
           <a:p>
             <a:fld id="{ED538819-822F-3A47-B60A-B2FA30DE689C}" type="datetimeFigureOut">
-              <a:t>9/28/19</a:t>
+              <a:t>14.10.23.</a:t>
             </a:fld>
             <a:endParaRPr lang="en-US"/>
           </a:p>
@@ -889,7 +1060,7 @@
           <a:lstStyle/>
           <a:p>
             <a:fld id="{ED538819-822F-3A47-B60A-B2FA30DE689C}" type="datetimeFigureOut">
-              <a:t>9/28/19</a:t>
+              <a:t>14.10.23.</a:t>
             </a:fld>
             <a:endParaRPr lang="en-US"/>
           </a:p>
@@ -1095,7 +1266,7 @@
           <a:lstStyle/>
           <a:p>
             <a:fld id="{ED538819-822F-3A47-B60A-B2FA30DE689C}" type="datetimeFigureOut">
-              <a:t>9/28/19</a:t>
+              <a:t>14.10.23.</a:t>
             </a:fld>
             <a:endParaRPr lang="en-US"/>
           </a:p>
@@ -1291,7 +1462,7 @@
           <a:lstStyle/>
           <a:p>
             <a:fld id="{ED538819-822F-3A47-B60A-B2FA30DE689C}" type="datetimeFigureOut">
-              <a:t>9/28/19</a:t>
+              <a:t>14.10.23.</a:t>
             </a:fld>
             <a:endParaRPr lang="en-US"/>
           </a:p>
@@ -1564,7 +1735,7 @@
           <a:lstStyle/>
           <a:p>
             <a:fld id="{ED538819-822F-3A47-B60A-B2FA30DE689C}" type="datetimeFigureOut">
-              <a:t>9/28/19</a:t>
+              <a:t>14.10.23.</a:t>
             </a:fld>
             <a:endParaRPr lang="en-US"/>
           </a:p>
@@ -1827,7 +1998,7 @@
           <a:lstStyle/>
           <a:p>
             <a:fld id="{ED538819-822F-3A47-B60A-B2FA30DE689C}" type="datetimeFigureOut">
-              <a:t>9/28/19</a:t>
+              <a:t>14.10.23.</a:t>
             </a:fld>
             <a:endParaRPr lang="en-US"/>
           </a:p>
@@ -2237,7 +2408,7 @@
           <a:lstStyle/>
           <a:p>
             <a:fld id="{ED538819-822F-3A47-B60A-B2FA30DE689C}" type="datetimeFigureOut">
-              <a:t>9/28/19</a:t>
+              <a:t>14.10.23.</a:t>
             </a:fld>
             <a:endParaRPr lang="en-US"/>
           </a:p>
@@ -2376,7 +2547,7 @@
           <a:lstStyle/>
           <a:p>
             <a:fld id="{ED538819-822F-3A47-B60A-B2FA30DE689C}" type="datetimeFigureOut">
-              <a:t>9/28/19</a:t>
+              <a:t>14.10.23.</a:t>
             </a:fld>
             <a:endParaRPr lang="en-US"/>
           </a:p>
@@ -2487,7 +2658,7 @@
           <a:lstStyle/>
           <a:p>
             <a:fld id="{ED538819-822F-3A47-B60A-B2FA30DE689C}" type="datetimeFigureOut">
-              <a:t>9/28/19</a:t>
+              <a:t>14.10.23.</a:t>
             </a:fld>
             <a:endParaRPr lang="en-US"/>
           </a:p>
@@ -2796,7 +2967,7 @@
           <a:lstStyle/>
           <a:p>
             <a:fld id="{ED538819-822F-3A47-B60A-B2FA30DE689C}" type="datetimeFigureOut">
-              <a:t>9/28/19</a:t>
+              <a:t>14.10.23.</a:t>
             </a:fld>
             <a:endParaRPr lang="en-US"/>
           </a:p>
@@ -3082,7 +3253,7 @@
           <a:lstStyle/>
           <a:p>
             <a:fld id="{ED538819-822F-3A47-B60A-B2FA30DE689C}" type="datetimeFigureOut">
-              <a:t>9/28/19</a:t>
+              <a:t>14.10.23.</a:t>
             </a:fld>
             <a:endParaRPr lang="en-US"/>
           </a:p>
@@ -3321,7 +3492,7 @@
           </a:lstStyle>
           <a:p>
             <a:fld id="{ED538819-822F-3A47-B60A-B2FA30DE689C}" type="datetimeFigureOut">
-              <a:t>9/28/19</a:t>
+              <a:t>14.10.23.</a:t>
             </a:fld>
             <a:endParaRPr lang="en-US"/>
           </a:p>
@@ -5941,9 +6112,18 @@
           <a:lstStyle/>
           <a:p>
             <a:r>
-              <a:rPr lang="en-US" sz="3200"/>
-              <a:t>Serijalizacija+deserijalizacija grafa</a:t>
+              <a:rPr lang="en-US" sz="3200" dirty="0" err="1"/>
+              <a:t>Serijalizacija+deserijalizacija</a:t>
             </a:r>
+            <a:r>
+              <a:rPr lang="en-US" sz="3200" dirty="0"/>
+              <a:t> </a:t>
+            </a:r>
+            <a:r>
+              <a:rPr lang="en-US" sz="3200" dirty="0" err="1"/>
+              <a:t>grafa</a:t>
+            </a:r>
+            <a:endParaRPr lang="en-US" sz="3200" dirty="0"/>
           </a:p>
         </p:txBody>
       </p:sp>
@@ -9469,6 +9649,1062 @@
     <p:extLst>
       <p:ext uri="{BB962C8B-B14F-4D97-AF65-F5344CB8AC3E}">
         <p14:creationId xmlns:p14="http://schemas.microsoft.com/office/powerpoint/2010/main" val="2762366586"/>
+      </p:ext>
+    </p:extLst>
+  </p:cSld>
+  <p:clrMapOvr>
+    <a:masterClrMapping/>
+  </p:clrMapOvr>
+</p:sld>
+</file>
+
+<file path=ppt/slides/slide4.xml><?xml version="1.0" encoding="utf-8"?>
+<p:sld xmlns:a="http://schemas.openxmlformats.org/drawingml/2006/main" xmlns:r="http://schemas.openxmlformats.org/officeDocument/2006/relationships" xmlns:p="http://schemas.openxmlformats.org/presentationml/2006/main">
+  <p:cSld>
+    <p:spTree>
+      <p:nvGrpSpPr>
+        <p:cNvPr id="1" name=""/>
+        <p:cNvGrpSpPr/>
+        <p:nvPr/>
+      </p:nvGrpSpPr>
+      <p:grpSpPr>
+        <a:xfrm>
+          <a:off x="0" y="0"/>
+          <a:ext cx="0" cy="0"/>
+          <a:chOff x="0" y="0"/>
+          <a:chExt cx="0" cy="0"/>
+        </a:xfrm>
+      </p:grpSpPr>
+      <p:sp>
+        <p:nvSpPr>
+          <p:cNvPr id="2" name="TextBox 1">
+            <a:extLst>
+              <a:ext uri="{FF2B5EF4-FFF2-40B4-BE49-F238E27FC236}">
+                <a16:creationId xmlns:a16="http://schemas.microsoft.com/office/drawing/2014/main" id="{92ECC15B-3C04-FB09-A0E4-C60E07FA6616}"/>
+              </a:ext>
+            </a:extLst>
+          </p:cNvPr>
+          <p:cNvSpPr txBox="1"/>
+          <p:nvPr/>
+        </p:nvSpPr>
+        <p:spPr>
+          <a:xfrm>
+            <a:off x="0" y="0"/>
+            <a:ext cx="1657441" cy="584775"/>
+          </a:xfrm>
+          <a:prstGeom prst="rect">
+            <a:avLst/>
+          </a:prstGeom>
+          <a:noFill/>
+        </p:spPr>
+        <p:txBody>
+          <a:bodyPr wrap="none" rtlCol="0">
+            <a:spAutoFit/>
+          </a:bodyPr>
+          <a:lstStyle/>
+          <a:p>
+            <a:r>
+              <a:rPr lang="en-US" sz="3200" dirty="0" err="1"/>
+              <a:t>GraphQL</a:t>
+            </a:r>
+            <a:endParaRPr lang="en-US" sz="3200" dirty="0"/>
+          </a:p>
+        </p:txBody>
+      </p:sp>
+      <p:sp>
+        <p:nvSpPr>
+          <p:cNvPr id="3" name="TextBox 2">
+            <a:extLst>
+              <a:ext uri="{FF2B5EF4-FFF2-40B4-BE49-F238E27FC236}">
+                <a16:creationId xmlns:a16="http://schemas.microsoft.com/office/drawing/2014/main" id="{D96A2703-06E4-DAF3-FD1C-202FE4F00F16}"/>
+              </a:ext>
+            </a:extLst>
+          </p:cNvPr>
+          <p:cNvSpPr txBox="1"/>
+          <p:nvPr/>
+        </p:nvSpPr>
+        <p:spPr>
+          <a:xfrm>
+            <a:off x="380611" y="784072"/>
+            <a:ext cx="5010731" cy="1015663"/>
+          </a:xfrm>
+          <a:prstGeom prst="rect">
+            <a:avLst/>
+          </a:prstGeom>
+          <a:noFill/>
+        </p:spPr>
+        <p:txBody>
+          <a:bodyPr wrap="none" rtlCol="0">
+            <a:spAutoFit/>
+          </a:bodyPr>
+          <a:lstStyle/>
+          <a:p>
+            <a:pPr marL="285750" indent="-285750">
+              <a:buFont typeface="Arial" panose="020B0604020202020204" pitchFamily="34" charset="0"/>
+              <a:buChar char="•"/>
+            </a:pPr>
+            <a:r>
+              <a:rPr lang="en-RS" sz="2000" dirty="0"/>
+              <a:t>samo jedan endpoint: POST /graphql</a:t>
+            </a:r>
+          </a:p>
+          <a:p>
+            <a:pPr marL="285750" indent="-285750">
+              <a:buFont typeface="Arial" panose="020B0604020202020204" pitchFamily="34" charset="0"/>
+              <a:buChar char="•"/>
+            </a:pPr>
+            <a:r>
+              <a:rPr lang="en-RS" sz="2000" dirty="0"/>
+              <a:t>generički API za pretragu i izmene podataka</a:t>
+            </a:r>
+          </a:p>
+          <a:p>
+            <a:pPr marL="285750" indent="-285750">
+              <a:buFont typeface="Arial" panose="020B0604020202020204" pitchFamily="34" charset="0"/>
+              <a:buChar char="•"/>
+            </a:pPr>
+            <a:r>
+              <a:rPr lang="en-RS" sz="2000" dirty="0"/>
+              <a:t>zasnovan na definicijama tipova</a:t>
+            </a:r>
+          </a:p>
+        </p:txBody>
+      </p:sp>
+      <p:pic>
+        <p:nvPicPr>
+          <p:cNvPr id="5" name="Picture 4" descr="A screen shot of a computer code&#10;&#10;Description automatically generated">
+            <a:extLst>
+              <a:ext uri="{FF2B5EF4-FFF2-40B4-BE49-F238E27FC236}">
+                <a16:creationId xmlns:a16="http://schemas.microsoft.com/office/drawing/2014/main" id="{6FB5A5B6-F094-DF73-6DE4-87CB26B6B0AD}"/>
+              </a:ext>
+            </a:extLst>
+          </p:cNvPr>
+          <p:cNvPicPr>
+            <a:picLocks noChangeAspect="1"/>
+          </p:cNvPicPr>
+          <p:nvPr/>
+        </p:nvPicPr>
+        <p:blipFill>
+          <a:blip r:embed="rId3"/>
+          <a:stretch>
+            <a:fillRect/>
+          </a:stretch>
+        </p:blipFill>
+        <p:spPr>
+          <a:xfrm>
+            <a:off x="518119" y="2274619"/>
+            <a:ext cx="3060700" cy="4457700"/>
+          </a:xfrm>
+          <a:prstGeom prst="rect">
+            <a:avLst/>
+          </a:prstGeom>
+        </p:spPr>
+      </p:pic>
+      <p:pic>
+        <p:nvPicPr>
+          <p:cNvPr id="7" name="Picture 6" descr="A screen shot of a computer&#10;&#10;Description automatically generated">
+            <a:extLst>
+              <a:ext uri="{FF2B5EF4-FFF2-40B4-BE49-F238E27FC236}">
+                <a16:creationId xmlns:a16="http://schemas.microsoft.com/office/drawing/2014/main" id="{922C0B32-17DB-B6E3-FF95-798B087D9BFA}"/>
+              </a:ext>
+            </a:extLst>
+          </p:cNvPr>
+          <p:cNvPicPr>
+            <a:picLocks noChangeAspect="1"/>
+          </p:cNvPicPr>
+          <p:nvPr/>
+        </p:nvPicPr>
+        <p:blipFill>
+          <a:blip r:embed="rId4"/>
+          <a:stretch>
+            <a:fillRect/>
+          </a:stretch>
+        </p:blipFill>
+        <p:spPr>
+          <a:xfrm>
+            <a:off x="6096000" y="1550719"/>
+            <a:ext cx="5905500" cy="5181600"/>
+          </a:xfrm>
+          <a:prstGeom prst="rect">
+            <a:avLst/>
+          </a:prstGeom>
+        </p:spPr>
+      </p:pic>
+    </p:spTree>
+    <p:extLst>
+      <p:ext uri="{BB962C8B-B14F-4D97-AF65-F5344CB8AC3E}">
+        <p14:creationId xmlns:p14="http://schemas.microsoft.com/office/powerpoint/2010/main" val="476279877"/>
+      </p:ext>
+    </p:extLst>
+  </p:cSld>
+  <p:clrMapOvr>
+    <a:masterClrMapping/>
+  </p:clrMapOvr>
+</p:sld>
+</file>
+
+<file path=ppt/slides/slide5.xml><?xml version="1.0" encoding="utf-8"?>
+<p:sld xmlns:a="http://schemas.openxmlformats.org/drawingml/2006/main" xmlns:r="http://schemas.openxmlformats.org/officeDocument/2006/relationships" xmlns:p="http://schemas.openxmlformats.org/presentationml/2006/main">
+  <p:cSld>
+    <p:spTree>
+      <p:nvGrpSpPr>
+        <p:cNvPr id="1" name=""/>
+        <p:cNvGrpSpPr/>
+        <p:nvPr/>
+      </p:nvGrpSpPr>
+      <p:grpSpPr>
+        <a:xfrm>
+          <a:off x="0" y="0"/>
+          <a:ext cx="0" cy="0"/>
+          <a:chOff x="0" y="0"/>
+          <a:chExt cx="0" cy="0"/>
+        </a:xfrm>
+      </p:grpSpPr>
+      <p:sp>
+        <p:nvSpPr>
+          <p:cNvPr id="2" name="TextBox 1">
+            <a:extLst>
+              <a:ext uri="{FF2B5EF4-FFF2-40B4-BE49-F238E27FC236}">
+                <a16:creationId xmlns:a16="http://schemas.microsoft.com/office/drawing/2014/main" id="{92ECC15B-3C04-FB09-A0E4-C60E07FA6616}"/>
+              </a:ext>
+            </a:extLst>
+          </p:cNvPr>
+          <p:cNvSpPr txBox="1"/>
+          <p:nvPr/>
+        </p:nvSpPr>
+        <p:spPr>
+          <a:xfrm>
+            <a:off x="0" y="0"/>
+            <a:ext cx="2510239" cy="584775"/>
+          </a:xfrm>
+          <a:prstGeom prst="rect">
+            <a:avLst/>
+          </a:prstGeom>
+          <a:noFill/>
+        </p:spPr>
+        <p:txBody>
+          <a:bodyPr wrap="none" rtlCol="0">
+            <a:spAutoFit/>
+          </a:bodyPr>
+          <a:lstStyle/>
+          <a:p>
+            <a:r>
+              <a:rPr lang="en-US" sz="3200" dirty="0" err="1"/>
+              <a:t>GraphQL</a:t>
+            </a:r>
+            <a:r>
+              <a:rPr lang="en-US" sz="3200" dirty="0"/>
+              <a:t> </a:t>
+            </a:r>
+            <a:r>
+              <a:rPr lang="en-US" sz="3200" dirty="0" err="1"/>
+              <a:t>upiti</a:t>
+            </a:r>
+            <a:endParaRPr lang="en-US" sz="3200" dirty="0"/>
+          </a:p>
+        </p:txBody>
+      </p:sp>
+      <p:pic>
+        <p:nvPicPr>
+          <p:cNvPr id="6" name="Picture 5" descr="A screenshot of a computer&#10;&#10;Description automatically generated">
+            <a:extLst>
+              <a:ext uri="{FF2B5EF4-FFF2-40B4-BE49-F238E27FC236}">
+                <a16:creationId xmlns:a16="http://schemas.microsoft.com/office/drawing/2014/main" id="{6B169214-B053-4760-0EB5-753A41F00ED9}"/>
+              </a:ext>
+            </a:extLst>
+          </p:cNvPr>
+          <p:cNvPicPr>
+            <a:picLocks noChangeAspect="1"/>
+          </p:cNvPicPr>
+          <p:nvPr/>
+        </p:nvPicPr>
+        <p:blipFill>
+          <a:blip r:embed="rId3"/>
+          <a:stretch>
+            <a:fillRect/>
+          </a:stretch>
+        </p:blipFill>
+        <p:spPr>
+          <a:xfrm>
+            <a:off x="2753851" y="0"/>
+            <a:ext cx="7610578" cy="6858000"/>
+          </a:xfrm>
+          <a:prstGeom prst="rect">
+            <a:avLst/>
+          </a:prstGeom>
+        </p:spPr>
+      </p:pic>
+    </p:spTree>
+    <p:extLst>
+      <p:ext uri="{BB962C8B-B14F-4D97-AF65-F5344CB8AC3E}">
+        <p14:creationId xmlns:p14="http://schemas.microsoft.com/office/powerpoint/2010/main" val="2783932731"/>
+      </p:ext>
+    </p:extLst>
+  </p:cSld>
+  <p:clrMapOvr>
+    <a:masterClrMapping/>
+  </p:clrMapOvr>
+</p:sld>
+</file>
+
+<file path=ppt/slides/slide6.xml><?xml version="1.0" encoding="utf-8"?>
+<p:sld xmlns:a="http://schemas.openxmlformats.org/drawingml/2006/main" xmlns:r="http://schemas.openxmlformats.org/officeDocument/2006/relationships" xmlns:p="http://schemas.openxmlformats.org/presentationml/2006/main">
+  <p:cSld>
+    <p:spTree>
+      <p:nvGrpSpPr>
+        <p:cNvPr id="1" name=""/>
+        <p:cNvGrpSpPr/>
+        <p:nvPr/>
+      </p:nvGrpSpPr>
+      <p:grpSpPr>
+        <a:xfrm>
+          <a:off x="0" y="0"/>
+          <a:ext cx="0" cy="0"/>
+          <a:chOff x="0" y="0"/>
+          <a:chExt cx="0" cy="0"/>
+        </a:xfrm>
+      </p:grpSpPr>
+      <p:graphicFrame>
+        <p:nvGraphicFramePr>
+          <p:cNvPr id="2" name="Table 1">
+            <a:extLst>
+              <a:ext uri="{FF2B5EF4-FFF2-40B4-BE49-F238E27FC236}">
+                <a16:creationId xmlns:a16="http://schemas.microsoft.com/office/drawing/2014/main" id="{BE57CF25-3D00-F5F4-4C3B-B78F2D8D6206}"/>
+              </a:ext>
+            </a:extLst>
+          </p:cNvPr>
+          <p:cNvGraphicFramePr>
+            <a:graphicFrameLocks noGrp="1"/>
+          </p:cNvGraphicFramePr>
+          <p:nvPr>
+            <p:extLst>
+              <p:ext uri="{D42A27DB-BD31-4B8C-83A1-F6EECF244321}">
+                <p14:modId xmlns:p14="http://schemas.microsoft.com/office/powerpoint/2010/main" val="127834683"/>
+              </p:ext>
+            </p:extLst>
+          </p:nvPr>
+        </p:nvGraphicFramePr>
+        <p:xfrm>
+          <a:off x="127322" y="973666"/>
+          <a:ext cx="11921925" cy="5186680"/>
+        </p:xfrm>
+        <a:graphic>
+          <a:graphicData uri="http://schemas.openxmlformats.org/drawingml/2006/table">
+            <a:tbl>
+              <a:tblPr firstRow="1" bandRow="1">
+                <a:tableStyleId>{5C22544A-7EE6-4342-B048-85BDC9FD1C3A}</a:tableStyleId>
+              </a:tblPr>
+              <a:tblGrid>
+                <a:gridCol w="3973975">
+                  <a:extLst>
+                    <a:ext uri="{9D8B030D-6E8A-4147-A177-3AD203B41FA5}">
+                      <a16:colId xmlns:a16="http://schemas.microsoft.com/office/drawing/2014/main" val="858094238"/>
+                    </a:ext>
+                  </a:extLst>
+                </a:gridCol>
+                <a:gridCol w="3973975">
+                  <a:extLst>
+                    <a:ext uri="{9D8B030D-6E8A-4147-A177-3AD203B41FA5}">
+                      <a16:colId xmlns:a16="http://schemas.microsoft.com/office/drawing/2014/main" val="3830449102"/>
+                    </a:ext>
+                  </a:extLst>
+                </a:gridCol>
+                <a:gridCol w="3973975">
+                  <a:extLst>
+                    <a:ext uri="{9D8B030D-6E8A-4147-A177-3AD203B41FA5}">
+                      <a16:colId xmlns:a16="http://schemas.microsoft.com/office/drawing/2014/main" val="590753954"/>
+                    </a:ext>
+                  </a:extLst>
+                </a:gridCol>
+              </a:tblGrid>
+              <a:tr h="0">
+                <a:tc>
+                  <a:txBody>
+                    <a:bodyPr/>
+                    <a:lstStyle/>
+                    <a:p>
+                      <a:endParaRPr lang="en-RS" dirty="0"/>
+                    </a:p>
+                  </a:txBody>
+                  <a:tcPr/>
+                </a:tc>
+                <a:tc>
+                  <a:txBody>
+                    <a:bodyPr/>
+                    <a:lstStyle/>
+                    <a:p>
+                      <a:r>
+                        <a:rPr lang="en-RS" dirty="0"/>
+                        <a:t>GraphQL</a:t>
+                      </a:r>
+                    </a:p>
+                  </a:txBody>
+                  <a:tcPr/>
+                </a:tc>
+                <a:tc>
+                  <a:txBody>
+                    <a:bodyPr/>
+                    <a:lstStyle/>
+                    <a:p>
+                      <a:r>
+                        <a:rPr lang="en-RS" dirty="0"/>
+                        <a:t>REST</a:t>
+                      </a:r>
+                    </a:p>
+                  </a:txBody>
+                  <a:tcPr/>
+                </a:tc>
+                <a:extLst>
+                  <a:ext uri="{0D108BD9-81ED-4DB2-BD59-A6C34878D82A}">
+                    <a16:rowId xmlns:a16="http://schemas.microsoft.com/office/drawing/2014/main" val="3477268850"/>
+                  </a:ext>
+                </a:extLst>
+              </a:tr>
+              <a:tr h="370840">
+                <a:tc>
+                  <a:txBody>
+                    <a:bodyPr/>
+                    <a:lstStyle/>
+                    <a:p>
+                      <a:r>
+                        <a:rPr lang="en-RS" dirty="0"/>
+                        <a:t>arhitektura</a:t>
+                      </a:r>
+                    </a:p>
+                  </a:txBody>
+                  <a:tcPr/>
+                </a:tc>
+                <a:tc>
+                  <a:txBody>
+                    <a:bodyPr/>
+                    <a:lstStyle/>
+                    <a:p>
+                      <a:r>
+                        <a:rPr lang="en-RS" dirty="0"/>
+                        <a:t>client-driven</a:t>
+                      </a:r>
+                    </a:p>
+                  </a:txBody>
+                  <a:tcPr/>
+                </a:tc>
+                <a:tc>
+                  <a:txBody>
+                    <a:bodyPr/>
+                    <a:lstStyle/>
+                    <a:p>
+                      <a:r>
+                        <a:rPr lang="en-RS" dirty="0"/>
+                        <a:t>server-driven</a:t>
+                      </a:r>
+                    </a:p>
+                  </a:txBody>
+                  <a:tcPr/>
+                </a:tc>
+                <a:extLst>
+                  <a:ext uri="{0D108BD9-81ED-4DB2-BD59-A6C34878D82A}">
+                    <a16:rowId xmlns:a16="http://schemas.microsoft.com/office/drawing/2014/main" val="3279401906"/>
+                  </a:ext>
+                </a:extLst>
+              </a:tr>
+              <a:tr h="370840">
+                <a:tc>
+                  <a:txBody>
+                    <a:bodyPr/>
+                    <a:lstStyle/>
+                    <a:p>
+                      <a:r>
+                        <a:rPr lang="en-RS" dirty="0"/>
+                        <a:t>izvor organizacije</a:t>
+                      </a:r>
+                    </a:p>
+                  </a:txBody>
+                  <a:tcPr/>
+                </a:tc>
+                <a:tc>
+                  <a:txBody>
+                    <a:bodyPr/>
+                    <a:lstStyle/>
+                    <a:p>
+                      <a:r>
+                        <a:rPr lang="en-RS" dirty="0"/>
+                        <a:t>šema i sistem tipova</a:t>
+                      </a:r>
+                    </a:p>
+                  </a:txBody>
+                  <a:tcPr/>
+                </a:tc>
+                <a:tc>
+                  <a:txBody>
+                    <a:bodyPr/>
+                    <a:lstStyle/>
+                    <a:p>
+                      <a:r>
+                        <a:rPr lang="en-RS" dirty="0"/>
+                        <a:t>endpoints</a:t>
+                      </a:r>
+                    </a:p>
+                  </a:txBody>
+                  <a:tcPr/>
+                </a:tc>
+                <a:extLst>
+                  <a:ext uri="{0D108BD9-81ED-4DB2-BD59-A6C34878D82A}">
+                    <a16:rowId xmlns:a16="http://schemas.microsoft.com/office/drawing/2014/main" val="2692673584"/>
+                  </a:ext>
+                </a:extLst>
+              </a:tr>
+              <a:tr h="370840">
+                <a:tc>
+                  <a:txBody>
+                    <a:bodyPr/>
+                    <a:lstStyle/>
+                    <a:p>
+                      <a:r>
+                        <a:rPr lang="en-RS" dirty="0"/>
+                        <a:t>operacije</a:t>
+                      </a:r>
+                    </a:p>
+                  </a:txBody>
+                  <a:tcPr/>
+                </a:tc>
+                <a:tc>
+                  <a:txBody>
+                    <a:bodyPr/>
+                    <a:lstStyle/>
+                    <a:p>
+                      <a:r>
+                        <a:rPr lang="en-RS" dirty="0"/>
+                        <a:t>query, mutation, subscription</a:t>
+                      </a:r>
+                    </a:p>
+                  </a:txBody>
+                  <a:tcPr/>
+                </a:tc>
+                <a:tc>
+                  <a:txBody>
+                    <a:bodyPr/>
+                    <a:lstStyle/>
+                    <a:p>
+                      <a:r>
+                        <a:rPr lang="en-RS" dirty="0"/>
+                        <a:t>create, read, update, delete</a:t>
+                      </a:r>
+                    </a:p>
+                  </a:txBody>
+                  <a:tcPr/>
+                </a:tc>
+                <a:extLst>
+                  <a:ext uri="{0D108BD9-81ED-4DB2-BD59-A6C34878D82A}">
+                    <a16:rowId xmlns:a16="http://schemas.microsoft.com/office/drawing/2014/main" val="1587022718"/>
+                  </a:ext>
+                </a:extLst>
+              </a:tr>
+              <a:tr h="370840">
+                <a:tc>
+                  <a:txBody>
+                    <a:bodyPr/>
+                    <a:lstStyle/>
+                    <a:p>
+                      <a:r>
+                        <a:rPr lang="en-RS" dirty="0"/>
+                        <a:t>dobavljanje podataka</a:t>
+                      </a:r>
+                    </a:p>
+                  </a:txBody>
+                  <a:tcPr/>
+                </a:tc>
+                <a:tc>
+                  <a:txBody>
+                    <a:bodyPr/>
+                    <a:lstStyle/>
+                    <a:p>
+                      <a:r>
+                        <a:rPr lang="en-RS" dirty="0"/>
+                        <a:t>specifični podaci jednim pozivom</a:t>
+                      </a:r>
+                    </a:p>
+                  </a:txBody>
+                  <a:tcPr/>
+                </a:tc>
+                <a:tc>
+                  <a:txBody>
+                    <a:bodyPr/>
+                    <a:lstStyle/>
+                    <a:p>
+                      <a:r>
+                        <a:rPr lang="en-RS" dirty="0"/>
+                        <a:t>podaci fiksne strukture kroz više poziva</a:t>
+                      </a:r>
+                    </a:p>
+                  </a:txBody>
+                  <a:tcPr/>
+                </a:tc>
+                <a:extLst>
+                  <a:ext uri="{0D108BD9-81ED-4DB2-BD59-A6C34878D82A}">
+                    <a16:rowId xmlns:a16="http://schemas.microsoft.com/office/drawing/2014/main" val="2164446917"/>
+                  </a:ext>
+                </a:extLst>
+              </a:tr>
+              <a:tr h="370840">
+                <a:tc>
+                  <a:txBody>
+                    <a:bodyPr/>
+                    <a:lstStyle/>
+                    <a:p>
+                      <a:r>
+                        <a:rPr lang="en-RS" dirty="0"/>
+                        <a:t>veličina zajednice</a:t>
+                      </a:r>
+                    </a:p>
+                  </a:txBody>
+                  <a:tcPr/>
+                </a:tc>
+                <a:tc>
+                  <a:txBody>
+                    <a:bodyPr/>
+                    <a:lstStyle/>
+                    <a:p>
+                      <a:r>
+                        <a:rPr lang="en-RS" dirty="0"/>
+                        <a:t>raste</a:t>
+                      </a:r>
+                    </a:p>
+                  </a:txBody>
+                  <a:tcPr/>
+                </a:tc>
+                <a:tc>
+                  <a:txBody>
+                    <a:bodyPr/>
+                    <a:lstStyle/>
+                    <a:p>
+                      <a:r>
+                        <a:rPr lang="en-RS" dirty="0"/>
+                        <a:t>velika</a:t>
+                      </a:r>
+                    </a:p>
+                  </a:txBody>
+                  <a:tcPr/>
+                </a:tc>
+                <a:extLst>
+                  <a:ext uri="{0D108BD9-81ED-4DB2-BD59-A6C34878D82A}">
+                    <a16:rowId xmlns:a16="http://schemas.microsoft.com/office/drawing/2014/main" val="2531803021"/>
+                  </a:ext>
+                </a:extLst>
+              </a:tr>
+              <a:tr h="370840">
+                <a:tc>
+                  <a:txBody>
+                    <a:bodyPr/>
+                    <a:lstStyle/>
+                    <a:p>
+                      <a:r>
+                        <a:rPr lang="en-RS" dirty="0"/>
+                        <a:t>performanse</a:t>
+                      </a:r>
+                    </a:p>
+                  </a:txBody>
+                  <a:tcPr/>
+                </a:tc>
+                <a:tc>
+                  <a:txBody>
+                    <a:bodyPr/>
+                    <a:lstStyle/>
+                    <a:p>
+                      <a:r>
+                        <a:rPr lang="en-RS" dirty="0"/>
+                        <a:t>dobra :D</a:t>
+                      </a:r>
+                    </a:p>
+                  </a:txBody>
+                  <a:tcPr/>
+                </a:tc>
+                <a:tc>
+                  <a:txBody>
+                    <a:bodyPr/>
+                    <a:lstStyle/>
+                    <a:p>
+                      <a:r>
+                        <a:rPr lang="en-RS" dirty="0"/>
+                        <a:t>veliki mrežni saobraćaj</a:t>
+                      </a:r>
+                    </a:p>
+                  </a:txBody>
+                  <a:tcPr/>
+                </a:tc>
+                <a:extLst>
+                  <a:ext uri="{0D108BD9-81ED-4DB2-BD59-A6C34878D82A}">
+                    <a16:rowId xmlns:a16="http://schemas.microsoft.com/office/drawing/2014/main" val="2169954367"/>
+                  </a:ext>
+                </a:extLst>
+              </a:tr>
+              <a:tr h="370840">
+                <a:tc>
+                  <a:txBody>
+                    <a:bodyPr/>
+                    <a:lstStyle/>
+                    <a:p>
+                      <a:r>
+                        <a:rPr lang="en-RS" dirty="0"/>
+                        <a:t>brzina razvoja</a:t>
+                      </a:r>
+                    </a:p>
+                  </a:txBody>
+                  <a:tcPr/>
+                </a:tc>
+                <a:tc>
+                  <a:txBody>
+                    <a:bodyPr/>
+                    <a:lstStyle/>
+                    <a:p>
+                      <a:r>
+                        <a:rPr lang="en-RS" dirty="0"/>
+                        <a:t>brža</a:t>
+                      </a:r>
+                    </a:p>
+                  </a:txBody>
+                  <a:tcPr/>
+                </a:tc>
+                <a:tc>
+                  <a:txBody>
+                    <a:bodyPr/>
+                    <a:lstStyle/>
+                    <a:p>
+                      <a:r>
+                        <a:rPr lang="en-RS" dirty="0"/>
+                        <a:t>sporija</a:t>
+                      </a:r>
+                    </a:p>
+                  </a:txBody>
+                  <a:tcPr/>
+                </a:tc>
+                <a:extLst>
+                  <a:ext uri="{0D108BD9-81ED-4DB2-BD59-A6C34878D82A}">
+                    <a16:rowId xmlns:a16="http://schemas.microsoft.com/office/drawing/2014/main" val="141866243"/>
+                  </a:ext>
+                </a:extLst>
+              </a:tr>
+              <a:tr h="370840">
+                <a:tc>
+                  <a:txBody>
+                    <a:bodyPr/>
+                    <a:lstStyle/>
+                    <a:p>
+                      <a:r>
+                        <a:rPr lang="en-RS" dirty="0"/>
+                        <a:t>kriva učenja</a:t>
+                      </a:r>
+                    </a:p>
+                  </a:txBody>
+                  <a:tcPr/>
+                </a:tc>
+                <a:tc>
+                  <a:txBody>
+                    <a:bodyPr/>
+                    <a:lstStyle/>
+                    <a:p>
+                      <a:r>
+                        <a:rPr lang="en-RS" dirty="0"/>
+                        <a:t>strma</a:t>
+                      </a:r>
+                    </a:p>
+                  </a:txBody>
+                  <a:tcPr/>
+                </a:tc>
+                <a:tc>
+                  <a:txBody>
+                    <a:bodyPr/>
+                    <a:lstStyle/>
+                    <a:p>
+                      <a:r>
+                        <a:rPr lang="en-RS" dirty="0"/>
+                        <a:t>umerena</a:t>
+                      </a:r>
+                    </a:p>
+                  </a:txBody>
+                  <a:tcPr/>
+                </a:tc>
+                <a:extLst>
+                  <a:ext uri="{0D108BD9-81ED-4DB2-BD59-A6C34878D82A}">
+                    <a16:rowId xmlns:a16="http://schemas.microsoft.com/office/drawing/2014/main" val="659919172"/>
+                  </a:ext>
+                </a:extLst>
+              </a:tr>
+              <a:tr h="370840">
+                <a:tc>
+                  <a:txBody>
+                    <a:bodyPr/>
+                    <a:lstStyle/>
+                    <a:p>
+                      <a:r>
+                        <a:rPr lang="en-RS" dirty="0"/>
+                        <a:t>samo-dokumentovanje</a:t>
+                      </a:r>
+                    </a:p>
+                  </a:txBody>
+                  <a:tcPr/>
+                </a:tc>
+                <a:tc>
+                  <a:txBody>
+                    <a:bodyPr/>
+                    <a:lstStyle/>
+                    <a:p>
+                      <a:r>
+                        <a:rPr lang="en-RS" dirty="0"/>
+                        <a:t>da</a:t>
+                      </a:r>
+                    </a:p>
+                  </a:txBody>
+                  <a:tcPr/>
+                </a:tc>
+                <a:tc>
+                  <a:txBody>
+                    <a:bodyPr/>
+                    <a:lstStyle/>
+                    <a:p>
+                      <a:r>
+                        <a:rPr lang="en-RS" dirty="0"/>
+                        <a:t>onako (OpenAPI)</a:t>
+                      </a:r>
+                    </a:p>
+                  </a:txBody>
+                  <a:tcPr/>
+                </a:tc>
+                <a:extLst>
+                  <a:ext uri="{0D108BD9-81ED-4DB2-BD59-A6C34878D82A}">
+                    <a16:rowId xmlns:a16="http://schemas.microsoft.com/office/drawing/2014/main" val="707318418"/>
+                  </a:ext>
+                </a:extLst>
+              </a:tr>
+              <a:tr h="370840">
+                <a:tc>
+                  <a:txBody>
+                    <a:bodyPr/>
+                    <a:lstStyle/>
+                    <a:p>
+                      <a:r>
+                        <a:rPr lang="en-RS" dirty="0"/>
+                        <a:t>file upload</a:t>
+                      </a:r>
+                    </a:p>
+                  </a:txBody>
+                  <a:tcPr/>
+                </a:tc>
+                <a:tc>
+                  <a:txBody>
+                    <a:bodyPr/>
+                    <a:lstStyle/>
+                    <a:p>
+                      <a:r>
+                        <a:rPr lang="en-RS" dirty="0"/>
+                        <a:t>ne</a:t>
+                      </a:r>
+                    </a:p>
+                  </a:txBody>
+                  <a:tcPr/>
+                </a:tc>
+                <a:tc>
+                  <a:txBody>
+                    <a:bodyPr/>
+                    <a:lstStyle/>
+                    <a:p>
+                      <a:r>
+                        <a:rPr lang="en-RS" dirty="0"/>
+                        <a:t>da</a:t>
+                      </a:r>
+                    </a:p>
+                  </a:txBody>
+                  <a:tcPr/>
+                </a:tc>
+                <a:extLst>
+                  <a:ext uri="{0D108BD9-81ED-4DB2-BD59-A6C34878D82A}">
+                    <a16:rowId xmlns:a16="http://schemas.microsoft.com/office/drawing/2014/main" val="1244025263"/>
+                  </a:ext>
+                </a:extLst>
+              </a:tr>
+              <a:tr h="370840">
+                <a:tc>
+                  <a:txBody>
+                    <a:bodyPr/>
+                    <a:lstStyle/>
+                    <a:p>
+                      <a:r>
+                        <a:rPr lang="en-RS" dirty="0"/>
+                        <a:t>web caching</a:t>
+                      </a:r>
+                    </a:p>
+                  </a:txBody>
+                  <a:tcPr/>
+                </a:tc>
+                <a:tc>
+                  <a:txBody>
+                    <a:bodyPr/>
+                    <a:lstStyle/>
+                    <a:p>
+                      <a:r>
+                        <a:rPr lang="en-RS" dirty="0"/>
+                        <a:t>teško</a:t>
+                      </a:r>
+                    </a:p>
+                  </a:txBody>
+                  <a:tcPr/>
+                </a:tc>
+                <a:tc>
+                  <a:txBody>
+                    <a:bodyPr/>
+                    <a:lstStyle/>
+                    <a:p>
+                      <a:r>
+                        <a:rPr lang="en-RS" dirty="0"/>
+                        <a:t>lako</a:t>
+                      </a:r>
+                    </a:p>
+                  </a:txBody>
+                  <a:tcPr/>
+                </a:tc>
+                <a:extLst>
+                  <a:ext uri="{0D108BD9-81ED-4DB2-BD59-A6C34878D82A}">
+                    <a16:rowId xmlns:a16="http://schemas.microsoft.com/office/drawing/2014/main" val="2905195822"/>
+                  </a:ext>
+                </a:extLst>
+              </a:tr>
+              <a:tr h="370840">
+                <a:tc>
+                  <a:txBody>
+                    <a:bodyPr/>
+                    <a:lstStyle/>
+                    <a:p>
+                      <a:r>
+                        <a:rPr lang="en-RS" dirty="0"/>
+                        <a:t>stabilnost</a:t>
+                      </a:r>
+                    </a:p>
+                  </a:txBody>
+                  <a:tcPr/>
+                </a:tc>
+                <a:tc>
+                  <a:txBody>
+                    <a:bodyPr/>
+                    <a:lstStyle/>
+                    <a:p>
+                      <a:r>
+                        <a:rPr lang="en-RS" dirty="0"/>
+                        <a:t>automatska validacija i provera grešaka</a:t>
+                      </a:r>
+                    </a:p>
+                  </a:txBody>
+                  <a:tcPr/>
+                </a:tc>
+                <a:tc>
+                  <a:txBody>
+                    <a:bodyPr/>
+                    <a:lstStyle/>
+                    <a:p>
+                      <a:r>
+                        <a:rPr lang="en-RS" dirty="0"/>
+                        <a:t>bolje za složene upite</a:t>
+                      </a:r>
+                    </a:p>
+                  </a:txBody>
+                  <a:tcPr/>
+                </a:tc>
+                <a:extLst>
+                  <a:ext uri="{0D108BD9-81ED-4DB2-BD59-A6C34878D82A}">
+                    <a16:rowId xmlns:a16="http://schemas.microsoft.com/office/drawing/2014/main" val="2334292913"/>
+                  </a:ext>
+                </a:extLst>
+              </a:tr>
+              <a:tr h="370840">
+                <a:tc>
+                  <a:txBody>
+                    <a:bodyPr/>
+                    <a:lstStyle/>
+                    <a:p>
+                      <a:r>
+                        <a:rPr lang="en-RS" dirty="0"/>
+                        <a:t>domen primene</a:t>
+                      </a:r>
+                    </a:p>
+                  </a:txBody>
+                  <a:tcPr/>
+                </a:tc>
+                <a:tc>
+                  <a:txBody>
+                    <a:bodyPr/>
+                    <a:lstStyle/>
+                    <a:p>
+                      <a:r>
+                        <a:rPr lang="en-RS" dirty="0"/>
+                        <a:t>mikroservisi, mobilne aplikacije</a:t>
+                      </a:r>
+                    </a:p>
+                  </a:txBody>
+                  <a:tcPr/>
+                </a:tc>
+                <a:tc>
+                  <a:txBody>
+                    <a:bodyPr/>
+                    <a:lstStyle/>
+                    <a:p>
+                      <a:r>
+                        <a:rPr lang="en-RS" dirty="0"/>
+                        <a:t>resource-driven aplikacije</a:t>
+                      </a:r>
+                    </a:p>
+                  </a:txBody>
+                  <a:tcPr/>
+                </a:tc>
+                <a:extLst>
+                  <a:ext uri="{0D108BD9-81ED-4DB2-BD59-A6C34878D82A}">
+                    <a16:rowId xmlns:a16="http://schemas.microsoft.com/office/drawing/2014/main" val="590672968"/>
+                  </a:ext>
+                </a:extLst>
+              </a:tr>
+            </a:tbl>
+          </a:graphicData>
+        </a:graphic>
+      </p:graphicFrame>
+      <p:sp>
+        <p:nvSpPr>
+          <p:cNvPr id="3" name="TextBox 2">
+            <a:extLst>
+              <a:ext uri="{FF2B5EF4-FFF2-40B4-BE49-F238E27FC236}">
+                <a16:creationId xmlns:a16="http://schemas.microsoft.com/office/drawing/2014/main" id="{C8798824-DCF4-65AD-345A-161C06F1DED4}"/>
+              </a:ext>
+            </a:extLst>
+          </p:cNvPr>
+          <p:cNvSpPr txBox="1"/>
+          <p:nvPr/>
+        </p:nvSpPr>
+        <p:spPr>
+          <a:xfrm>
+            <a:off x="0" y="0"/>
+            <a:ext cx="2993705" cy="584775"/>
+          </a:xfrm>
+          <a:prstGeom prst="rect">
+            <a:avLst/>
+          </a:prstGeom>
+          <a:noFill/>
+        </p:spPr>
+        <p:txBody>
+          <a:bodyPr wrap="none" rtlCol="0">
+            <a:spAutoFit/>
+          </a:bodyPr>
+          <a:lstStyle/>
+          <a:p>
+            <a:r>
+              <a:rPr lang="en-US" sz="3200" dirty="0" err="1"/>
+              <a:t>GraphQL</a:t>
+            </a:r>
+            <a:r>
+              <a:rPr lang="en-US" sz="3200" dirty="0"/>
+              <a:t> vs REST</a:t>
+            </a:r>
+          </a:p>
+        </p:txBody>
+      </p:sp>
+    </p:spTree>
+    <p:extLst>
+      <p:ext uri="{BB962C8B-B14F-4D97-AF65-F5344CB8AC3E}">
+        <p14:creationId xmlns:p14="http://schemas.microsoft.com/office/powerpoint/2010/main" val="2655389513"/>
       </p:ext>
     </p:extLst>
   </p:cSld>

</xml_diff>